<commit_message>
1. Inclusão de uma figura à apresentação de slides do MVP
</commit_message>
<xml_diff>
--- a/MVP/MVP04-05/Apresentação MVP04-05.pptx
+++ b/MVP/MVP04-05/Apresentação MVP04-05.pptx
@@ -27461,7 +27461,7 @@
         </p:blipFill>
         <p:spPr>
           <a:xfrm>
-            <a:off x="3053292" y="3368040"/>
+            <a:off x="2996142" y="1068705"/>
             <a:ext cx="8324850" cy="3124200"/>
           </a:xfrm>
           <a:prstGeom prst="rect">
@@ -27491,7 +27491,7 @@
         </p:blipFill>
         <p:spPr>
           <a:xfrm>
-            <a:off x="957792" y="4191000"/>
+            <a:off x="1100667" y="2362200"/>
             <a:ext cx="1019175" cy="1066800"/>
           </a:xfrm>
           <a:prstGeom prst="rect">
@@ -27501,10 +27501,10 @@
       </p:pic>
       <p:pic>
         <p:nvPicPr>
-          <p:cNvPr id="6" name="Imagem 5">
+          <p:cNvPr id="4" name="Imagem 3">
             <a:extLst>
               <a:ext uri="{FF2B5EF4-FFF2-40B4-BE49-F238E27FC236}">
-                <a16:creationId xmlns:a16="http://schemas.microsoft.com/office/drawing/2014/main" id="{3FC1F388-01B6-4BB9-B88F-66074B9596A5}"/>
+                <a16:creationId xmlns:a16="http://schemas.microsoft.com/office/drawing/2014/main" id="{6E938503-D0C1-4F61-91D7-67EE375EB804}"/>
               </a:ext>
             </a:extLst>
           </p:cNvPr>
@@ -27521,8 +27521,8 @@
         </p:blipFill>
         <p:spPr>
           <a:xfrm>
-            <a:off x="1909233" y="975360"/>
-            <a:ext cx="7896225" cy="2257425"/>
+            <a:off x="3877204" y="4598670"/>
+            <a:ext cx="4429125" cy="1352550"/>
           </a:xfrm>
           <a:prstGeom prst="rect">
             <a:avLst/>

</xml_diff>